<commit_message>
uploading asels changes and new readme
</commit_message>
<xml_diff>
--- a/heart.pptx
+++ b/heart.pptx
@@ -9,7 +9,9 @@
     <p:sldId id="258" r:id="rId3"/>
     <p:sldId id="256" r:id="rId4"/>
     <p:sldId id="259" r:id="rId5"/>
-    <p:sldId id="260" r:id="rId6"/>
+    <p:sldId id="262" r:id="rId6"/>
+    <p:sldId id="261" r:id="rId7"/>
+    <p:sldId id="260" r:id="rId8"/>
   </p:sldIdLst>
   <p:sldSz cx="12192000" cy="6858000"/>
   <p:notesSz cx="6858000" cy="9144000"/>
@@ -108,6 +110,11 @@
       </a:defRPr>
     </a:lvl9pPr>
   </p:defaultTextStyle>
+  <p:extLst>
+    <p:ext uri="{EFAFB233-063F-42B5-8137-9DF3F51BA10A}">
+      <p15:sldGuideLst xmlns:p15="http://schemas.microsoft.com/office/powerpoint/2012/main"/>
+    </p:ext>
+  </p:extLst>
 </p:presentation>
 </file>
 
@@ -4086,33 +4093,36 @@
       </p:sp>
       <p:sp>
         <p:nvSpPr>
-          <p:cNvPr id="3" name="Content Placeholder 2">
-            <a:extLst>
-              <a:ext uri="{FF2B5EF4-FFF2-40B4-BE49-F238E27FC236}">
-                <a16:creationId xmlns:a16="http://schemas.microsoft.com/office/drawing/2014/main" id="{63A2CB9F-090A-4971-BBF2-AE593A9CC087}"/>
-              </a:ext>
-            </a:extLst>
-          </p:cNvPr>
-          <p:cNvSpPr>
-            <a:spLocks noGrp="1"/>
-          </p:cNvSpPr>
-          <p:nvPr>
-            <p:ph idx="1"/>
-          </p:nvPr>
+          <p:cNvPr id="4" name="TextBox 3">
+            <a:extLst>
+              <a:ext uri="{FF2B5EF4-FFF2-40B4-BE49-F238E27FC236}">
+                <a16:creationId xmlns:a16="http://schemas.microsoft.com/office/drawing/2014/main" id="{BD235F4E-49DF-4636-B322-B58F4E35E1A9}"/>
+              </a:ext>
+            </a:extLst>
+          </p:cNvPr>
+          <p:cNvSpPr txBox="1"/>
+          <p:nvPr/>
         </p:nvSpPr>
         <p:spPr>
           <a:xfrm>
-            <a:off x="371094" y="2718054"/>
-            <a:ext cx="3438906" cy="3207258"/>
-          </a:xfrm>
-        </p:spPr>
-        <p:txBody>
-          <a:bodyPr anchor="t">
-            <a:normAutofit/>
+            <a:off x="371094" y="2759310"/>
+            <a:ext cx="5187820" cy="923330"/>
+          </a:xfrm>
+          <a:prstGeom prst="rect">
+            <a:avLst/>
+          </a:prstGeom>
+          <a:noFill/>
+        </p:spPr>
+        <p:txBody>
+          <a:bodyPr wrap="square" rtlCol="0">
+            <a:spAutoFit/>
           </a:bodyPr>
           <a:lstStyle/>
           <a:p>
-            <a:endParaRPr lang="en-US" sz="1700"/>
+            <a:r>
+              <a:rPr lang="en-US" dirty="0"/>
+              <a:t>To determine the most important features in heart failure/heart disease. Utilize machine learning and data visualization tools for better understanding.</a:t>
+            </a:r>
           </a:p>
         </p:txBody>
       </p:sp>
@@ -4543,33 +4553,100 @@
       </p:sp>
       <p:sp>
         <p:nvSpPr>
-          <p:cNvPr id="3078" name="Content Placeholder 3077">
-            <a:extLst>
-              <a:ext uri="{FF2B5EF4-FFF2-40B4-BE49-F238E27FC236}">
-                <a16:creationId xmlns:a16="http://schemas.microsoft.com/office/drawing/2014/main" id="{AD29817E-5388-45CB-8BBB-A3265035D8AE}"/>
-              </a:ext>
-            </a:extLst>
-          </p:cNvPr>
-          <p:cNvSpPr>
-            <a:spLocks noGrp="1"/>
-          </p:cNvSpPr>
-          <p:nvPr>
-            <p:ph idx="1"/>
-          </p:nvPr>
+          <p:cNvPr id="3" name="TextBox 2">
+            <a:extLst>
+              <a:ext uri="{FF2B5EF4-FFF2-40B4-BE49-F238E27FC236}">
+                <a16:creationId xmlns:a16="http://schemas.microsoft.com/office/drawing/2014/main" id="{45E6930D-B92A-4F1D-932E-4D888A312957}"/>
+              </a:ext>
+            </a:extLst>
+          </p:cNvPr>
+          <p:cNvSpPr txBox="1"/>
+          <p:nvPr/>
         </p:nvSpPr>
         <p:spPr>
           <a:xfrm>
-            <a:off x="371094" y="2718054"/>
-            <a:ext cx="3438906" cy="3207258"/>
-          </a:xfrm>
-        </p:spPr>
-        <p:txBody>
-          <a:bodyPr anchor="t">
-            <a:normAutofit/>
+            <a:off x="511728" y="2869035"/>
+            <a:ext cx="7021586" cy="2031325"/>
+          </a:xfrm>
+          <a:prstGeom prst="rect">
+            <a:avLst/>
+          </a:prstGeom>
+          <a:noFill/>
+        </p:spPr>
+        <p:txBody>
+          <a:bodyPr wrap="square" rtlCol="0">
+            <a:spAutoFit/>
           </a:bodyPr>
           <a:lstStyle/>
           <a:p>
-            <a:endParaRPr lang="en-US" sz="1700"/>
+            <a:pPr marL="285750" indent="-285750">
+              <a:buFont typeface="Arial" panose="020B0604020202020204" pitchFamily="34" charset="0"/>
+              <a:buChar char="•"/>
+            </a:pPr>
+            <a:r>
+              <a:rPr lang="en-US" dirty="0"/>
+              <a:t>Teamwork</a:t>
+            </a:r>
+          </a:p>
+          <a:p>
+            <a:pPr marL="285750" indent="-285750">
+              <a:buFont typeface="Arial" panose="020B0604020202020204" pitchFamily="34" charset="0"/>
+              <a:buChar char="•"/>
+            </a:pPr>
+            <a:r>
+              <a:rPr lang="en-US" dirty="0"/>
+              <a:t>Decide on the models of Supervised and Unsupervised ML:</a:t>
+            </a:r>
+          </a:p>
+          <a:p>
+            <a:pPr marL="742950" lvl="1" indent="-285750">
+              <a:buFont typeface="Arial" panose="020B0604020202020204" pitchFamily="34" charset="0"/>
+              <a:buChar char="•"/>
+            </a:pPr>
+            <a:r>
+              <a:rPr lang="en-US" dirty="0"/>
+              <a:t>Logistic Regression</a:t>
+            </a:r>
+          </a:p>
+          <a:p>
+            <a:pPr marL="742950" lvl="1" indent="-285750">
+              <a:buFont typeface="Arial" panose="020B0604020202020204" pitchFamily="34" charset="0"/>
+              <a:buChar char="•"/>
+            </a:pPr>
+            <a:r>
+              <a:rPr lang="en-US" dirty="0"/>
+              <a:t>KNN, Random Forest</a:t>
+            </a:r>
+          </a:p>
+          <a:p>
+            <a:pPr marL="742950" lvl="1" indent="-285750">
+              <a:buFont typeface="Arial" panose="020B0604020202020204" pitchFamily="34" charset="0"/>
+              <a:buChar char="•"/>
+            </a:pPr>
+            <a:r>
+              <a:rPr lang="en-US" dirty="0"/>
+              <a:t>Clustering</a:t>
+            </a:r>
+          </a:p>
+          <a:p>
+            <a:pPr marL="285750" indent="-285750">
+              <a:buFont typeface="Arial" panose="020B0604020202020204" pitchFamily="34" charset="0"/>
+              <a:buChar char="•"/>
+            </a:pPr>
+            <a:r>
+              <a:rPr lang="en-US" dirty="0"/>
+              <a:t>Draw conclusion on basis of these models.</a:t>
+            </a:r>
+          </a:p>
+          <a:p>
+            <a:pPr marL="285750" indent="-285750">
+              <a:buFont typeface="Arial" panose="020B0604020202020204" pitchFamily="34" charset="0"/>
+              <a:buChar char="•"/>
+            </a:pPr>
+            <a:r>
+              <a:rPr lang="en-US" dirty="0"/>
+              <a:t>Data cleaning, analysis and visualization. </a:t>
+            </a:r>
           </a:p>
         </p:txBody>
       </p:sp>
@@ -4589,6 +4666,14 @@
 <file path=ppt/slides/slide4.xml><?xml version="1.0" encoding="utf-8"?>
 <p:sld xmlns:a="http://schemas.openxmlformats.org/drawingml/2006/main" xmlns:r="http://schemas.openxmlformats.org/officeDocument/2006/relationships" xmlns:p="http://schemas.openxmlformats.org/presentationml/2006/main">
   <p:cSld>
+    <p:bg>
+      <p:bgPr>
+        <a:solidFill>
+          <a:schemeClr val="bg1"/>
+        </a:solidFill>
+        <a:effectLst/>
+      </p:bgPr>
+    </p:bg>
     <p:spTree>
       <p:nvGrpSpPr>
         <p:cNvPr id="1" name=""/>
@@ -4603,6 +4688,197 @@
           <a:chExt cx="0" cy="0"/>
         </a:xfrm>
       </p:grpSpPr>
+      <p:sp useBgFill="1">
+        <p:nvSpPr>
+          <p:cNvPr id="29" name="Rectangle 13">
+            <a:extLst>
+              <a:ext uri="{FF2B5EF4-FFF2-40B4-BE49-F238E27FC236}">
+                <a16:creationId xmlns:a16="http://schemas.microsoft.com/office/drawing/2014/main" id="{9AA72BD9-2C5A-4EDC-931F-5AA08EACA0F3}"/>
+              </a:ext>
+              <a:ext uri="{C183D7F6-B498-43B3-948B-1728B52AA6E4}">
+                <adec:decorative xmlns:adec="http://schemas.microsoft.com/office/drawing/2017/decorative" val="1"/>
+              </a:ext>
+            </a:extLst>
+          </p:cNvPr>
+          <p:cNvSpPr>
+            <a:spLocks noGrp="1" noRot="1" noChangeAspect="1" noMove="1" noResize="1" noEditPoints="1" noAdjustHandles="1" noChangeArrowheads="1" noChangeShapeType="1" noTextEdit="1"/>
+          </p:cNvSpPr>
+          <p:nvPr>
+            <p:extLst>
+              <p:ext uri="{386F3935-93C4-4BCD-93E2-E3B085C9AB24}">
+                <p16:designElem xmlns:p16="http://schemas.microsoft.com/office/powerpoint/2015/main" val="1"/>
+              </p:ext>
+            </p:extLst>
+          </p:nvPr>
+        </p:nvSpPr>
+        <p:spPr>
+          <a:xfrm>
+            <a:off x="0" y="0"/>
+            <a:ext cx="12192000" cy="6858000"/>
+          </a:xfrm>
+          <a:prstGeom prst="rect">
+            <a:avLst/>
+          </a:prstGeom>
+          <a:ln>
+            <a:noFill/>
+          </a:ln>
+        </p:spPr>
+        <p:style>
+          <a:lnRef idx="2">
+            <a:schemeClr val="accent1">
+              <a:shade val="50000"/>
+            </a:schemeClr>
+          </a:lnRef>
+          <a:fillRef idx="1">
+            <a:schemeClr val="accent1"/>
+          </a:fillRef>
+          <a:effectRef idx="0">
+            <a:schemeClr val="accent1"/>
+          </a:effectRef>
+          <a:fontRef idx="minor">
+            <a:schemeClr val="lt1"/>
+          </a:fontRef>
+        </p:style>
+        <p:txBody>
+          <a:bodyPr rtlCol="0" anchor="ctr"/>
+          <a:lstStyle/>
+          <a:p>
+            <a:pPr algn="ctr"/>
+            <a:endParaRPr lang="en-US"/>
+          </a:p>
+        </p:txBody>
+      </p:sp>
+      <p:pic>
+        <p:nvPicPr>
+          <p:cNvPr id="7" name="Picture 2" descr="Background with a monitor heartbeat, heart Stock Vector Image by ©Alkestida  #7935926">
+            <a:extLst>
+              <a:ext uri="{FF2B5EF4-FFF2-40B4-BE49-F238E27FC236}">
+                <a16:creationId xmlns:a16="http://schemas.microsoft.com/office/drawing/2014/main" id="{7BA8C8EC-85BD-4F73-9B0A-7CF539B5414F}"/>
+              </a:ext>
+            </a:extLst>
+          </p:cNvPr>
+          <p:cNvPicPr>
+            <a:picLocks noChangeAspect="1" noChangeArrowheads="1"/>
+          </p:cNvPicPr>
+          <p:nvPr/>
+        </p:nvPicPr>
+        <p:blipFill rotWithShape="1">
+          <a:blip r:embed="rId2">
+            <a:extLst>
+              <a:ext uri="{28A0092B-C50C-407E-A947-70E740481C1C}">
+                <a14:useLocalDpi xmlns:a14="http://schemas.microsoft.com/office/drawing/2010/main" val="0"/>
+              </a:ext>
+            </a:extLst>
+          </a:blip>
+          <a:srcRect t="13014" r="9090" b="3849"/>
+          <a:stretch/>
+        </p:blipFill>
+        <p:spPr bwMode="auto">
+          <a:xfrm>
+            <a:off x="3522468" y="10"/>
+            <a:ext cx="8669532" cy="6857990"/>
+          </a:xfrm>
+          <a:prstGeom prst="rect">
+            <a:avLst/>
+          </a:prstGeom>
+          <a:noFill/>
+          <a:extLst>
+            <a:ext uri="{909E8E84-426E-40DD-AFC4-6F175D3DCCD1}">
+              <a14:hiddenFill xmlns:a14="http://schemas.microsoft.com/office/drawing/2010/main">
+                <a:solidFill>
+                  <a:srgbClr val="FFFFFF"/>
+                </a:solidFill>
+              </a14:hiddenFill>
+            </a:ext>
+          </a:extLst>
+        </p:spPr>
+      </p:pic>
+      <p:sp>
+        <p:nvSpPr>
+          <p:cNvPr id="30" name="Rectangle 15">
+            <a:extLst>
+              <a:ext uri="{FF2B5EF4-FFF2-40B4-BE49-F238E27FC236}">
+                <a16:creationId xmlns:a16="http://schemas.microsoft.com/office/drawing/2014/main" id="{DD3981AC-7B61-4947-BCF3-F7AA7FA385B9}"/>
+              </a:ext>
+              <a:ext uri="{C183D7F6-B498-43B3-948B-1728B52AA6E4}">
+                <adec:decorative xmlns:adec="http://schemas.microsoft.com/office/drawing/2017/decorative" val="1"/>
+              </a:ext>
+            </a:extLst>
+          </p:cNvPr>
+          <p:cNvSpPr>
+            <a:spLocks noGrp="1" noRot="1" noChangeAspect="1" noMove="1" noResize="1" noEditPoints="1" noAdjustHandles="1" noChangeArrowheads="1" noChangeShapeType="1" noTextEdit="1"/>
+          </p:cNvSpPr>
+          <p:nvPr>
+            <p:extLst>
+              <p:ext uri="{386F3935-93C4-4BCD-93E2-E3B085C9AB24}">
+                <p16:designElem xmlns:p16="http://schemas.microsoft.com/office/powerpoint/2015/main" val="1"/>
+              </p:ext>
+            </p:extLst>
+          </p:nvPr>
+        </p:nvSpPr>
+        <p:spPr>
+          <a:xfrm>
+            <a:off x="2" y="0"/>
+            <a:ext cx="9756601" cy="6858000"/>
+          </a:xfrm>
+          <a:prstGeom prst="rect">
+            <a:avLst/>
+          </a:prstGeom>
+          <a:gradFill>
+            <a:gsLst>
+              <a:gs pos="58000">
+                <a:schemeClr val="bg1"/>
+              </a:gs>
+              <a:gs pos="35000">
+                <a:schemeClr val="bg1">
+                  <a:alpha val="78000"/>
+                </a:schemeClr>
+              </a:gs>
+              <a:gs pos="19000">
+                <a:schemeClr val="bg1">
+                  <a:alpha val="38000"/>
+                </a:schemeClr>
+              </a:gs>
+              <a:gs pos="0">
+                <a:schemeClr val="bg1">
+                  <a:alpha val="0"/>
+                </a:schemeClr>
+              </a:gs>
+              <a:gs pos="100000">
+                <a:schemeClr val="bg1"/>
+              </a:gs>
+            </a:gsLst>
+            <a:lin ang="10800000" scaled="0"/>
+          </a:gradFill>
+          <a:ln>
+            <a:noFill/>
+          </a:ln>
+        </p:spPr>
+        <p:style>
+          <a:lnRef idx="2">
+            <a:schemeClr val="accent1">
+              <a:shade val="50000"/>
+            </a:schemeClr>
+          </a:lnRef>
+          <a:fillRef idx="1">
+            <a:schemeClr val="accent1"/>
+          </a:fillRef>
+          <a:effectRef idx="0">
+            <a:schemeClr val="accent1"/>
+          </a:effectRef>
+          <a:fontRef idx="minor">
+            <a:schemeClr val="lt1"/>
+          </a:fontRef>
+        </p:style>
+        <p:txBody>
+          <a:bodyPr rtlCol="0" anchor="ctr"/>
+          <a:lstStyle/>
+          <a:p>
+            <a:pPr algn="ctr"/>
+            <a:endParaRPr lang="en-US" dirty="0"/>
+          </a:p>
+        </p:txBody>
+      </p:sp>
       <p:sp>
         <p:nvSpPr>
           <p:cNvPr id="4" name="Title 3">
@@ -4619,40 +4895,313 @@
             <p:ph type="title"/>
           </p:nvPr>
         </p:nvSpPr>
-        <p:spPr/>
-        <p:txBody>
-          <a:bodyPr/>
-          <a:lstStyle/>
-          <a:p>
+        <p:spPr>
+          <a:xfrm>
+            <a:off x="371094" y="1161288"/>
+            <a:ext cx="3438144" cy="1124712"/>
+          </a:xfrm>
+        </p:spPr>
+        <p:txBody>
+          <a:bodyPr anchor="b">
+            <a:normAutofit/>
+          </a:bodyPr>
+          <a:lstStyle/>
+          <a:p>
+            <a:r>
+              <a:rPr lang="en-US" sz="2800" dirty="0"/>
+              <a:t>Findings</a:t>
+            </a:r>
+          </a:p>
+        </p:txBody>
+      </p:sp>
+      <p:sp>
+        <p:nvSpPr>
+          <p:cNvPr id="31" name="Rectangle 17">
+            <a:extLst>
+              <a:ext uri="{FF2B5EF4-FFF2-40B4-BE49-F238E27FC236}">
+                <a16:creationId xmlns:a16="http://schemas.microsoft.com/office/drawing/2014/main" id="{55D4142C-5077-457F-A6AD-3FECFDB39685}"/>
+              </a:ext>
+              <a:ext uri="{C183D7F6-B498-43B3-948B-1728B52AA6E4}">
+                <adec:decorative xmlns:adec="http://schemas.microsoft.com/office/drawing/2017/decorative" val="1"/>
+              </a:ext>
+            </a:extLst>
+          </p:cNvPr>
+          <p:cNvSpPr>
+            <a:spLocks noGrp="1" noRot="1" noChangeAspect="1" noMove="1" noResize="1" noEditPoints="1" noAdjustHandles="1" noChangeArrowheads="1" noChangeShapeType="1" noTextEdit="1"/>
+          </p:cNvSpPr>
+          <p:nvPr>
+            <p:extLst>
+              <p:ext uri="{386F3935-93C4-4BCD-93E2-E3B085C9AB24}">
+                <p16:designElem xmlns:p16="http://schemas.microsoft.com/office/powerpoint/2015/main" val="1"/>
+              </p:ext>
+            </p:extLst>
+          </p:nvPr>
+        </p:nvSpPr>
+        <p:spPr>
+          <a:xfrm rot="5400000">
+            <a:off x="662559" y="605790"/>
+            <a:ext cx="73152" cy="548640"/>
+          </a:xfrm>
+          <a:prstGeom prst="rect">
+            <a:avLst/>
+          </a:prstGeom>
+          <a:solidFill>
+            <a:schemeClr val="accent2"/>
+          </a:solidFill>
+          <a:ln>
+            <a:noFill/>
+          </a:ln>
+        </p:spPr>
+        <p:style>
+          <a:lnRef idx="2">
+            <a:schemeClr val="accent1">
+              <a:shade val="50000"/>
+            </a:schemeClr>
+          </a:lnRef>
+          <a:fillRef idx="1">
+            <a:schemeClr val="accent1"/>
+          </a:fillRef>
+          <a:effectRef idx="0">
+            <a:schemeClr val="accent1"/>
+          </a:effectRef>
+          <a:fontRef idx="minor">
+            <a:schemeClr val="lt1"/>
+          </a:fontRef>
+        </p:style>
+        <p:txBody>
+          <a:bodyPr rtlCol="0" anchor="ctr"/>
+          <a:lstStyle/>
+          <a:p>
+            <a:pPr algn="ctr"/>
+            <a:endParaRPr lang="en-US">
+              <a:solidFill>
+                <a:prstClr val="white"/>
+              </a:solidFill>
+              <a:latin typeface="Calibri" panose="020F0502020204030204"/>
+            </a:endParaRPr>
+          </a:p>
+        </p:txBody>
+      </p:sp>
+      <p:sp>
+        <p:nvSpPr>
+          <p:cNvPr id="32" name="Rectangle 19">
+            <a:extLst>
+              <a:ext uri="{FF2B5EF4-FFF2-40B4-BE49-F238E27FC236}">
+                <a16:creationId xmlns:a16="http://schemas.microsoft.com/office/drawing/2014/main" id="{7A5F0580-5EE9-419F-96EE-B6529EF6E7D0}"/>
+              </a:ext>
+              <a:ext uri="{C183D7F6-B498-43B3-948B-1728B52AA6E4}">
+                <adec:decorative xmlns:adec="http://schemas.microsoft.com/office/drawing/2017/decorative" val="1"/>
+              </a:ext>
+            </a:extLst>
+          </p:cNvPr>
+          <p:cNvSpPr>
+            <a:spLocks noGrp="1" noRot="1" noChangeAspect="1" noMove="1" noResize="1" noEditPoints="1" noAdjustHandles="1" noChangeArrowheads="1" noChangeShapeType="1" noTextEdit="1"/>
+          </p:cNvSpPr>
+          <p:nvPr>
+            <p:extLst>
+              <p:ext uri="{386F3935-93C4-4BCD-93E2-E3B085C9AB24}">
+                <p16:designElem xmlns:p16="http://schemas.microsoft.com/office/powerpoint/2015/main" val="1"/>
+              </p:ext>
+            </p:extLst>
+          </p:nvPr>
+        </p:nvSpPr>
+        <p:spPr>
+          <a:xfrm>
+            <a:off x="428244" y="2443480"/>
+            <a:ext cx="3300984" cy="18288"/>
+          </a:xfrm>
+          <a:prstGeom prst="rect">
+            <a:avLst/>
+          </a:prstGeom>
+          <a:solidFill>
+            <a:schemeClr val="tx1"/>
+          </a:solidFill>
+          <a:ln w="3175">
+            <a:noFill/>
+          </a:ln>
+          <a:effectLst/>
+        </p:spPr>
+        <p:style>
+          <a:lnRef idx="2">
+            <a:schemeClr val="accent1">
+              <a:shade val="50000"/>
+            </a:schemeClr>
+          </a:lnRef>
+          <a:fillRef idx="1">
+            <a:schemeClr val="accent1"/>
+          </a:fillRef>
+          <a:effectRef idx="0">
+            <a:schemeClr val="accent1"/>
+          </a:effectRef>
+          <a:fontRef idx="minor">
+            <a:schemeClr val="lt1"/>
+          </a:fontRef>
+        </p:style>
+        <p:txBody>
+          <a:bodyPr rtlCol="0" anchor="ctr"/>
+          <a:lstStyle/>
+          <a:p>
+            <a:pPr marL="0" marR="0" lvl="0" indent="0" algn="ctr" defTabSz="914400" rtl="0" eaLnBrk="1" fontAlgn="auto" latinLnBrk="0" hangingPunct="1">
+              <a:lnSpc>
+                <a:spcPct val="100000"/>
+              </a:lnSpc>
+              <a:spcBef>
+                <a:spcPts val="0"/>
+              </a:spcBef>
+              <a:spcAft>
+                <a:spcPts val="0"/>
+              </a:spcAft>
+              <a:buClrTx/>
+              <a:buSzTx/>
+              <a:buFontTx/>
+              <a:buNone/>
+              <a:tabLst/>
+              <a:defRPr/>
+            </a:pPr>
+            <a:endParaRPr kumimoji="0" lang="en-US" sz="1800" b="0" i="0" u="none" strike="noStrike" kern="1200" cap="none" spc="0" normalizeH="0" baseline="0" noProof="0">
+              <a:ln>
+                <a:noFill/>
+              </a:ln>
+              <a:solidFill>
+                <a:prstClr val="white"/>
+              </a:solidFill>
+              <a:effectLst/>
+              <a:uLnTx/>
+              <a:uFillTx/>
+              <a:latin typeface="Calibri" panose="020F0502020204030204"/>
+              <a:ea typeface="+mn-ea"/>
+              <a:cs typeface="+mn-cs"/>
+            </a:endParaRPr>
+          </a:p>
+        </p:txBody>
+      </p:sp>
+      <p:sp>
+        <p:nvSpPr>
+          <p:cNvPr id="8" name="TextBox 7">
+            <a:extLst>
+              <a:ext uri="{FF2B5EF4-FFF2-40B4-BE49-F238E27FC236}">
+                <a16:creationId xmlns:a16="http://schemas.microsoft.com/office/drawing/2014/main" id="{D780AB87-890E-40E1-BF17-22477BBAF4B3}"/>
+              </a:ext>
+            </a:extLst>
+          </p:cNvPr>
+          <p:cNvSpPr txBox="1"/>
+          <p:nvPr/>
+        </p:nvSpPr>
+        <p:spPr>
+          <a:xfrm>
+            <a:off x="612729" y="2637456"/>
+            <a:ext cx="6987697" cy="3693319"/>
+          </a:xfrm>
+          <a:prstGeom prst="rect">
+            <a:avLst/>
+          </a:prstGeom>
+          <a:noFill/>
+        </p:spPr>
+        <p:txBody>
+          <a:bodyPr wrap="square" rtlCol="0">
+            <a:spAutoFit/>
+          </a:bodyPr>
+          <a:lstStyle/>
+          <a:p>
+            <a:pPr marL="285750" indent="-285750">
+              <a:buFont typeface="Arial" panose="020B0604020202020204" pitchFamily="34" charset="0"/>
+              <a:buChar char="•"/>
+            </a:pPr>
             <a:r>
               <a:rPr lang="en-US" dirty="0"/>
-              <a:t>Findings</a:t>
-            </a:r>
-          </a:p>
-        </p:txBody>
-      </p:sp>
-      <p:sp>
-        <p:nvSpPr>
-          <p:cNvPr id="5" name="Content Placeholder 4">
-            <a:extLst>
-              <a:ext uri="{FF2B5EF4-FFF2-40B4-BE49-F238E27FC236}">
-                <a16:creationId xmlns:a16="http://schemas.microsoft.com/office/drawing/2014/main" id="{377130E7-C32B-4455-887B-FE07045D583F}"/>
-              </a:ext>
-            </a:extLst>
-          </p:cNvPr>
-          <p:cNvSpPr>
-            <a:spLocks noGrp="1"/>
-          </p:cNvSpPr>
-          <p:nvPr>
-            <p:ph idx="1"/>
-          </p:nvPr>
-        </p:nvSpPr>
-        <p:spPr/>
-        <p:txBody>
-          <a:bodyPr/>
-          <a:lstStyle/>
-          <a:p>
-            <a:endParaRPr lang="en-US"/>
+              <a:t>Male are more prone to get heart disease</a:t>
+            </a:r>
+          </a:p>
+          <a:p>
+            <a:pPr marL="285750" indent="-285750">
+              <a:buFont typeface="Arial" panose="020B0604020202020204" pitchFamily="34" charset="0"/>
+              <a:buChar char="•"/>
+            </a:pPr>
+            <a:r>
+              <a:rPr lang="en-US" dirty="0"/>
+              <a:t>55% of the patients have the heart disease in the dataset </a:t>
+            </a:r>
+          </a:p>
+          <a:p>
+            <a:pPr marL="285750" indent="-285750">
+              <a:buFont typeface="Arial" panose="020B0604020202020204" pitchFamily="34" charset="0"/>
+              <a:buChar char="•"/>
+            </a:pPr>
+            <a:r>
+              <a:rPr lang="en-US" dirty="0"/>
+              <a:t>Correlation: we found the highly correlated variables to hear diseases were:</a:t>
+            </a:r>
+          </a:p>
+          <a:p>
+            <a:pPr marL="742950" lvl="1" indent="-285750">
+              <a:buFont typeface="Arial" panose="020B0604020202020204" pitchFamily="34" charset="0"/>
+              <a:buChar char="•"/>
+            </a:pPr>
+            <a:endParaRPr lang="en-US" dirty="0"/>
+          </a:p>
+          <a:p>
+            <a:pPr marL="285750" indent="-285750">
+              <a:buFont typeface="Arial" panose="020B0604020202020204" pitchFamily="34" charset="0"/>
+              <a:buChar char="•"/>
+            </a:pPr>
+            <a:r>
+              <a:rPr lang="en-US" dirty="0"/>
+              <a:t>Scores :</a:t>
+            </a:r>
+          </a:p>
+          <a:p>
+            <a:pPr marL="742950" lvl="1" indent="-285750">
+              <a:buFont typeface="Arial" panose="020B0604020202020204" pitchFamily="34" charset="0"/>
+              <a:buChar char="•"/>
+            </a:pPr>
+            <a:endParaRPr lang="en-US" dirty="0"/>
+          </a:p>
+          <a:p>
+            <a:pPr marL="285750" indent="-285750">
+              <a:buFont typeface="Arial" panose="020B0604020202020204" pitchFamily="34" charset="0"/>
+              <a:buChar char="•"/>
+            </a:pPr>
+            <a:r>
+              <a:rPr lang="en-US" dirty="0"/>
+              <a:t>Possibility of clustering </a:t>
+            </a:r>
+          </a:p>
+          <a:p>
+            <a:pPr marL="285750" indent="-285750">
+              <a:buFont typeface="Arial" panose="020B0604020202020204" pitchFamily="34" charset="0"/>
+              <a:buChar char="•"/>
+            </a:pPr>
+            <a:r>
+              <a:rPr lang="en-US" b="0" i="0" dirty="0">
+                <a:solidFill>
+                  <a:srgbClr val="1D1C1D"/>
+                </a:solidFill>
+                <a:effectLst/>
+                <a:latin typeface="Slack-Lato"/>
+              </a:rPr>
+              <a:t>We know that </a:t>
+            </a:r>
+            <a:r>
+              <a:rPr lang="en-US" b="0" i="0" dirty="0" err="1">
+                <a:solidFill>
+                  <a:srgbClr val="1D1C1D"/>
+                </a:solidFill>
+                <a:effectLst/>
+                <a:latin typeface="Slack-Lato"/>
+              </a:rPr>
+              <a:t>MaxHR</a:t>
+            </a:r>
+            <a:r>
+              <a:rPr lang="en-US" b="0" i="0" dirty="0">
+                <a:solidFill>
+                  <a:srgbClr val="1D1C1D"/>
+                </a:solidFill>
+                <a:effectLst/>
+                <a:latin typeface="Slack-Lato"/>
+              </a:rPr>
+              <a:t> is a good indicator that damage to one's heart has occurred due to heart disease.  Using machine model I found that we can predict Heart disease at a 65% rate and this is confirmed when combined with Cholesterol and Resting features increased the prediction to 68%.</a:t>
+            </a:r>
+            <a:endParaRPr lang="en-US" dirty="0"/>
           </a:p>
         </p:txBody>
       </p:sp>
@@ -4664,7 +5213,7 @@
     </p:extLst>
   </p:cSld>
   <p:clrMapOvr>
-    <a:masterClrMapping/>
+    <a:overrideClrMapping bg1="dk1" tx1="lt1" bg2="dk2" tx2="lt2" accent1="accent1" accent2="accent2" accent3="accent3" accent4="accent4" accent5="accent5" accent6="accent6" hlink="hlink" folHlink="folHlink"/>
   </p:clrMapOvr>
 </p:sld>
 </file>
@@ -4672,6 +5221,14 @@
 <file path=ppt/slides/slide5.xml><?xml version="1.0" encoding="utf-8"?>
 <p:sld xmlns:a="http://schemas.openxmlformats.org/drawingml/2006/main" xmlns:r="http://schemas.openxmlformats.org/officeDocument/2006/relationships" xmlns:p="http://schemas.openxmlformats.org/presentationml/2006/main">
   <p:cSld>
+    <p:bg>
+      <p:bgPr>
+        <a:solidFill>
+          <a:schemeClr val="bg1"/>
+        </a:solidFill>
+        <a:effectLst/>
+      </p:bgPr>
+    </p:bg>
     <p:spTree>
       <p:nvGrpSpPr>
         <p:cNvPr id="1" name=""/>
@@ -4686,6 +5243,197 @@
           <a:chExt cx="0" cy="0"/>
         </a:xfrm>
       </p:grpSpPr>
+      <p:sp useBgFill="1">
+        <p:nvSpPr>
+          <p:cNvPr id="3080" name="Rectangle 74">
+            <a:extLst>
+              <a:ext uri="{FF2B5EF4-FFF2-40B4-BE49-F238E27FC236}">
+                <a16:creationId xmlns:a16="http://schemas.microsoft.com/office/drawing/2014/main" id="{9AA72BD9-2C5A-4EDC-931F-5AA08EACA0F3}"/>
+              </a:ext>
+              <a:ext uri="{C183D7F6-B498-43B3-948B-1728B52AA6E4}">
+                <adec:decorative xmlns:adec="http://schemas.microsoft.com/office/drawing/2017/decorative" val="1"/>
+              </a:ext>
+            </a:extLst>
+          </p:cNvPr>
+          <p:cNvSpPr>
+            <a:spLocks noGrp="1" noRot="1" noChangeAspect="1" noMove="1" noResize="1" noEditPoints="1" noAdjustHandles="1" noChangeArrowheads="1" noChangeShapeType="1" noTextEdit="1"/>
+          </p:cNvSpPr>
+          <p:nvPr>
+            <p:extLst>
+              <p:ext uri="{386F3935-93C4-4BCD-93E2-E3B085C9AB24}">
+                <p16:designElem xmlns:p16="http://schemas.microsoft.com/office/powerpoint/2015/main" val="1"/>
+              </p:ext>
+            </p:extLst>
+          </p:nvPr>
+        </p:nvSpPr>
+        <p:spPr>
+          <a:xfrm>
+            <a:off x="0" y="0"/>
+            <a:ext cx="12192000" cy="6858000"/>
+          </a:xfrm>
+          <a:prstGeom prst="rect">
+            <a:avLst/>
+          </a:prstGeom>
+          <a:ln>
+            <a:noFill/>
+          </a:ln>
+        </p:spPr>
+        <p:style>
+          <a:lnRef idx="2">
+            <a:schemeClr val="accent1">
+              <a:shade val="50000"/>
+            </a:schemeClr>
+          </a:lnRef>
+          <a:fillRef idx="1">
+            <a:schemeClr val="accent1"/>
+          </a:fillRef>
+          <a:effectRef idx="0">
+            <a:schemeClr val="accent1"/>
+          </a:effectRef>
+          <a:fontRef idx="minor">
+            <a:schemeClr val="lt1"/>
+          </a:fontRef>
+        </p:style>
+        <p:txBody>
+          <a:bodyPr rtlCol="0" anchor="ctr"/>
+          <a:lstStyle/>
+          <a:p>
+            <a:pPr algn="ctr"/>
+            <a:endParaRPr lang="en-US"/>
+          </a:p>
+        </p:txBody>
+      </p:sp>
+      <p:pic>
+        <p:nvPicPr>
+          <p:cNvPr id="9" name="Picture 2" descr="Structure and Function of the Heart">
+            <a:extLst>
+              <a:ext uri="{FF2B5EF4-FFF2-40B4-BE49-F238E27FC236}">
+                <a16:creationId xmlns:a16="http://schemas.microsoft.com/office/drawing/2014/main" id="{E36943A8-973D-486F-91A4-3E3A352FFE3F}"/>
+              </a:ext>
+            </a:extLst>
+          </p:cNvPr>
+          <p:cNvPicPr>
+            <a:picLocks noChangeAspect="1" noChangeArrowheads="1"/>
+          </p:cNvPicPr>
+          <p:nvPr/>
+        </p:nvPicPr>
+        <p:blipFill rotWithShape="1">
+          <a:blip r:embed="rId2">
+            <a:extLst>
+              <a:ext uri="{28A0092B-C50C-407E-A947-70E740481C1C}">
+                <a14:useLocalDpi xmlns:a14="http://schemas.microsoft.com/office/drawing/2010/main" val="0"/>
+              </a:ext>
+            </a:extLst>
+          </a:blip>
+          <a:srcRect l="2824" t="9091" r="17880" b="2"/>
+          <a:stretch/>
+        </p:blipFill>
+        <p:spPr bwMode="auto">
+          <a:xfrm>
+            <a:off x="3522468" y="10"/>
+            <a:ext cx="8669532" cy="6857990"/>
+          </a:xfrm>
+          <a:prstGeom prst="rect">
+            <a:avLst/>
+          </a:prstGeom>
+          <a:noFill/>
+          <a:extLst>
+            <a:ext uri="{909E8E84-426E-40DD-AFC4-6F175D3DCCD1}">
+              <a14:hiddenFill xmlns:a14="http://schemas.microsoft.com/office/drawing/2010/main">
+                <a:solidFill>
+                  <a:srgbClr val="FFFFFF"/>
+                </a:solidFill>
+              </a14:hiddenFill>
+            </a:ext>
+          </a:extLst>
+        </p:spPr>
+      </p:pic>
+      <p:sp>
+        <p:nvSpPr>
+          <p:cNvPr id="3081" name="Rectangle 76">
+            <a:extLst>
+              <a:ext uri="{FF2B5EF4-FFF2-40B4-BE49-F238E27FC236}">
+                <a16:creationId xmlns:a16="http://schemas.microsoft.com/office/drawing/2014/main" id="{DD3981AC-7B61-4947-BCF3-F7AA7FA385B9}"/>
+              </a:ext>
+              <a:ext uri="{C183D7F6-B498-43B3-948B-1728B52AA6E4}">
+                <adec:decorative xmlns:adec="http://schemas.microsoft.com/office/drawing/2017/decorative" val="1"/>
+              </a:ext>
+            </a:extLst>
+          </p:cNvPr>
+          <p:cNvSpPr>
+            <a:spLocks noGrp="1" noRot="1" noChangeAspect="1" noMove="1" noResize="1" noEditPoints="1" noAdjustHandles="1" noChangeArrowheads="1" noChangeShapeType="1" noTextEdit="1"/>
+          </p:cNvSpPr>
+          <p:nvPr>
+            <p:extLst>
+              <p:ext uri="{386F3935-93C4-4BCD-93E2-E3B085C9AB24}">
+                <p16:designElem xmlns:p16="http://schemas.microsoft.com/office/powerpoint/2015/main" val="1"/>
+              </p:ext>
+            </p:extLst>
+          </p:nvPr>
+        </p:nvSpPr>
+        <p:spPr>
+          <a:xfrm>
+            <a:off x="2" y="0"/>
+            <a:ext cx="9756601" cy="6858000"/>
+          </a:xfrm>
+          <a:prstGeom prst="rect">
+            <a:avLst/>
+          </a:prstGeom>
+          <a:gradFill>
+            <a:gsLst>
+              <a:gs pos="58000">
+                <a:schemeClr val="bg1"/>
+              </a:gs>
+              <a:gs pos="35000">
+                <a:schemeClr val="bg1">
+                  <a:alpha val="78000"/>
+                </a:schemeClr>
+              </a:gs>
+              <a:gs pos="19000">
+                <a:schemeClr val="bg1">
+                  <a:alpha val="38000"/>
+                </a:schemeClr>
+              </a:gs>
+              <a:gs pos="0">
+                <a:schemeClr val="bg1">
+                  <a:alpha val="0"/>
+                </a:schemeClr>
+              </a:gs>
+              <a:gs pos="100000">
+                <a:schemeClr val="bg1"/>
+              </a:gs>
+            </a:gsLst>
+            <a:lin ang="10800000" scaled="0"/>
+          </a:gradFill>
+          <a:ln>
+            <a:noFill/>
+          </a:ln>
+        </p:spPr>
+        <p:style>
+          <a:lnRef idx="2">
+            <a:schemeClr val="accent1">
+              <a:shade val="50000"/>
+            </a:schemeClr>
+          </a:lnRef>
+          <a:fillRef idx="1">
+            <a:schemeClr val="accent1"/>
+          </a:fillRef>
+          <a:effectRef idx="0">
+            <a:schemeClr val="accent1"/>
+          </a:effectRef>
+          <a:fontRef idx="minor">
+            <a:schemeClr val="lt1"/>
+          </a:fontRef>
+        </p:style>
+        <p:txBody>
+          <a:bodyPr rtlCol="0" anchor="ctr"/>
+          <a:lstStyle/>
+          <a:p>
+            <a:pPr algn="ctr"/>
+            <a:endParaRPr lang="en-US" dirty="0"/>
+          </a:p>
+        </p:txBody>
+      </p:sp>
       <p:sp>
         <p:nvSpPr>
           <p:cNvPr id="4" name="Title 3">
@@ -4702,13 +5450,946 @@
             <p:ph type="title"/>
           </p:nvPr>
         </p:nvSpPr>
-        <p:spPr/>
-        <p:txBody>
-          <a:bodyPr/>
-          <a:lstStyle/>
-          <a:p>
-            <a:r>
-              <a:rPr lang="en-US" dirty="0"/>
+        <p:spPr>
+          <a:xfrm>
+            <a:off x="371094" y="1161288"/>
+            <a:ext cx="3438144" cy="1124712"/>
+          </a:xfrm>
+        </p:spPr>
+        <p:txBody>
+          <a:bodyPr anchor="b">
+            <a:normAutofit/>
+          </a:bodyPr>
+          <a:lstStyle/>
+          <a:p>
+            <a:r>
+              <a:rPr lang="en-US" sz="2800" dirty="0"/>
+              <a:t>Findings</a:t>
+            </a:r>
+          </a:p>
+        </p:txBody>
+      </p:sp>
+      <p:sp>
+        <p:nvSpPr>
+          <p:cNvPr id="3082" name="Rectangle 78">
+            <a:extLst>
+              <a:ext uri="{FF2B5EF4-FFF2-40B4-BE49-F238E27FC236}">
+                <a16:creationId xmlns:a16="http://schemas.microsoft.com/office/drawing/2014/main" id="{55D4142C-5077-457F-A6AD-3FECFDB39685}"/>
+              </a:ext>
+              <a:ext uri="{C183D7F6-B498-43B3-948B-1728B52AA6E4}">
+                <adec:decorative xmlns:adec="http://schemas.microsoft.com/office/drawing/2017/decorative" val="1"/>
+              </a:ext>
+            </a:extLst>
+          </p:cNvPr>
+          <p:cNvSpPr>
+            <a:spLocks noGrp="1" noRot="1" noChangeAspect="1" noMove="1" noResize="1" noEditPoints="1" noAdjustHandles="1" noChangeArrowheads="1" noChangeShapeType="1" noTextEdit="1"/>
+          </p:cNvSpPr>
+          <p:nvPr>
+            <p:extLst>
+              <p:ext uri="{386F3935-93C4-4BCD-93E2-E3B085C9AB24}">
+                <p16:designElem xmlns:p16="http://schemas.microsoft.com/office/powerpoint/2015/main" val="1"/>
+              </p:ext>
+            </p:extLst>
+          </p:nvPr>
+        </p:nvSpPr>
+        <p:spPr>
+          <a:xfrm rot="5400000">
+            <a:off x="662559" y="605790"/>
+            <a:ext cx="73152" cy="548640"/>
+          </a:xfrm>
+          <a:prstGeom prst="rect">
+            <a:avLst/>
+          </a:prstGeom>
+          <a:solidFill>
+            <a:schemeClr val="accent2"/>
+          </a:solidFill>
+          <a:ln>
+            <a:noFill/>
+          </a:ln>
+        </p:spPr>
+        <p:style>
+          <a:lnRef idx="2">
+            <a:schemeClr val="accent1">
+              <a:shade val="50000"/>
+            </a:schemeClr>
+          </a:lnRef>
+          <a:fillRef idx="1">
+            <a:schemeClr val="accent1"/>
+          </a:fillRef>
+          <a:effectRef idx="0">
+            <a:schemeClr val="accent1"/>
+          </a:effectRef>
+          <a:fontRef idx="minor">
+            <a:schemeClr val="lt1"/>
+          </a:fontRef>
+        </p:style>
+        <p:txBody>
+          <a:bodyPr rtlCol="0" anchor="ctr"/>
+          <a:lstStyle/>
+          <a:p>
+            <a:pPr algn="ctr"/>
+            <a:endParaRPr lang="en-US">
+              <a:solidFill>
+                <a:prstClr val="white"/>
+              </a:solidFill>
+              <a:latin typeface="Calibri" panose="020F0502020204030204"/>
+            </a:endParaRPr>
+          </a:p>
+        </p:txBody>
+      </p:sp>
+      <p:sp>
+        <p:nvSpPr>
+          <p:cNvPr id="81" name="Rectangle 80">
+            <a:extLst>
+              <a:ext uri="{FF2B5EF4-FFF2-40B4-BE49-F238E27FC236}">
+                <a16:creationId xmlns:a16="http://schemas.microsoft.com/office/drawing/2014/main" id="{7A5F0580-5EE9-419F-96EE-B6529EF6E7D0}"/>
+              </a:ext>
+              <a:ext uri="{C183D7F6-B498-43B3-948B-1728B52AA6E4}">
+                <adec:decorative xmlns:adec="http://schemas.microsoft.com/office/drawing/2017/decorative" val="1"/>
+              </a:ext>
+            </a:extLst>
+          </p:cNvPr>
+          <p:cNvSpPr>
+            <a:spLocks noGrp="1" noRot="1" noChangeAspect="1" noMove="1" noResize="1" noEditPoints="1" noAdjustHandles="1" noChangeArrowheads="1" noChangeShapeType="1" noTextEdit="1"/>
+          </p:cNvSpPr>
+          <p:nvPr>
+            <p:extLst>
+              <p:ext uri="{386F3935-93C4-4BCD-93E2-E3B085C9AB24}">
+                <p16:designElem xmlns:p16="http://schemas.microsoft.com/office/powerpoint/2015/main" val="1"/>
+              </p:ext>
+            </p:extLst>
+          </p:nvPr>
+        </p:nvSpPr>
+        <p:spPr>
+          <a:xfrm>
+            <a:off x="428244" y="2443480"/>
+            <a:ext cx="3300984" cy="18288"/>
+          </a:xfrm>
+          <a:prstGeom prst="rect">
+            <a:avLst/>
+          </a:prstGeom>
+          <a:solidFill>
+            <a:schemeClr val="tx1"/>
+          </a:solidFill>
+          <a:ln w="3175">
+            <a:noFill/>
+          </a:ln>
+          <a:effectLst/>
+        </p:spPr>
+        <p:style>
+          <a:lnRef idx="2">
+            <a:schemeClr val="accent1">
+              <a:shade val="50000"/>
+            </a:schemeClr>
+          </a:lnRef>
+          <a:fillRef idx="1">
+            <a:schemeClr val="accent1"/>
+          </a:fillRef>
+          <a:effectRef idx="0">
+            <a:schemeClr val="accent1"/>
+          </a:effectRef>
+          <a:fontRef idx="minor">
+            <a:schemeClr val="lt1"/>
+          </a:fontRef>
+        </p:style>
+        <p:txBody>
+          <a:bodyPr rtlCol="0" anchor="ctr"/>
+          <a:lstStyle/>
+          <a:p>
+            <a:pPr marL="0" marR="0" lvl="0" indent="0" algn="ctr" defTabSz="914400" rtl="0" eaLnBrk="1" fontAlgn="auto" latinLnBrk="0" hangingPunct="1">
+              <a:lnSpc>
+                <a:spcPct val="100000"/>
+              </a:lnSpc>
+              <a:spcBef>
+                <a:spcPts val="0"/>
+              </a:spcBef>
+              <a:spcAft>
+                <a:spcPts val="0"/>
+              </a:spcAft>
+              <a:buClrTx/>
+              <a:buSzTx/>
+              <a:buFontTx/>
+              <a:buNone/>
+              <a:tabLst/>
+              <a:defRPr/>
+            </a:pPr>
+            <a:endParaRPr kumimoji="0" lang="en-US" sz="1800" b="0" i="0" u="none" strike="noStrike" kern="1200" cap="none" spc="0" normalizeH="0" baseline="0" noProof="0">
+              <a:ln>
+                <a:noFill/>
+              </a:ln>
+              <a:solidFill>
+                <a:prstClr val="white"/>
+              </a:solidFill>
+              <a:effectLst/>
+              <a:uLnTx/>
+              <a:uFillTx/>
+              <a:latin typeface="Calibri" panose="020F0502020204030204"/>
+              <a:ea typeface="+mn-ea"/>
+              <a:cs typeface="+mn-cs"/>
+            </a:endParaRPr>
+          </a:p>
+        </p:txBody>
+      </p:sp>
+      <p:pic>
+        <p:nvPicPr>
+          <p:cNvPr id="8" name="Picture 7">
+            <a:extLst>
+              <a:ext uri="{FF2B5EF4-FFF2-40B4-BE49-F238E27FC236}">
+                <a16:creationId xmlns:a16="http://schemas.microsoft.com/office/drawing/2014/main" id="{48430F54-08C0-4A14-A56B-183B40845889}"/>
+              </a:ext>
+            </a:extLst>
+          </p:cNvPr>
+          <p:cNvPicPr>
+            <a:picLocks noChangeAspect="1"/>
+          </p:cNvPicPr>
+          <p:nvPr/>
+        </p:nvPicPr>
+        <p:blipFill>
+          <a:blip r:embed="rId3"/>
+          <a:stretch>
+            <a:fillRect/>
+          </a:stretch>
+        </p:blipFill>
+        <p:spPr>
+          <a:xfrm>
+            <a:off x="5264561" y="1367411"/>
+            <a:ext cx="6796338" cy="4959490"/>
+          </a:xfrm>
+          <a:prstGeom prst="rect">
+            <a:avLst/>
+          </a:prstGeom>
+        </p:spPr>
+      </p:pic>
+      <p:pic>
+        <p:nvPicPr>
+          <p:cNvPr id="13" name="Picture 12">
+            <a:extLst>
+              <a:ext uri="{FF2B5EF4-FFF2-40B4-BE49-F238E27FC236}">
+                <a16:creationId xmlns:a16="http://schemas.microsoft.com/office/drawing/2014/main" id="{8D098CEC-1F47-417A-8414-0797BCA43531}"/>
+              </a:ext>
+            </a:extLst>
+          </p:cNvPr>
+          <p:cNvPicPr>
+            <a:picLocks noChangeAspect="1"/>
+          </p:cNvPicPr>
+          <p:nvPr/>
+        </p:nvPicPr>
+        <p:blipFill>
+          <a:blip r:embed="rId4"/>
+          <a:stretch>
+            <a:fillRect/>
+          </a:stretch>
+        </p:blipFill>
+        <p:spPr>
+          <a:xfrm>
+            <a:off x="513635" y="2655996"/>
+            <a:ext cx="4626629" cy="3480473"/>
+          </a:xfrm>
+          <a:prstGeom prst="rect">
+            <a:avLst/>
+          </a:prstGeom>
+        </p:spPr>
+      </p:pic>
+    </p:spTree>
+    <p:extLst>
+      <p:ext uri="{BB962C8B-B14F-4D97-AF65-F5344CB8AC3E}">
+        <p14:creationId xmlns:p14="http://schemas.microsoft.com/office/powerpoint/2010/main" val="3935702926"/>
+      </p:ext>
+    </p:extLst>
+  </p:cSld>
+  <p:clrMapOvr>
+    <a:overrideClrMapping bg1="dk1" tx1="lt1" bg2="dk2" tx2="lt2" accent1="accent1" accent2="accent2" accent3="accent3" accent4="accent4" accent5="accent5" accent6="accent6" hlink="hlink" folHlink="folHlink"/>
+  </p:clrMapOvr>
+</p:sld>
+</file>
+
+<file path=ppt/slides/slide6.xml><?xml version="1.0" encoding="utf-8"?>
+<p:sld xmlns:a="http://schemas.openxmlformats.org/drawingml/2006/main" xmlns:r="http://schemas.openxmlformats.org/officeDocument/2006/relationships" xmlns:p="http://schemas.openxmlformats.org/presentationml/2006/main">
+  <p:cSld>
+    <p:bg>
+      <p:bgPr>
+        <a:solidFill>
+          <a:schemeClr val="bg1"/>
+        </a:solidFill>
+        <a:effectLst/>
+      </p:bgPr>
+    </p:bg>
+    <p:spTree>
+      <p:nvGrpSpPr>
+        <p:cNvPr id="1" name=""/>
+        <p:cNvGrpSpPr/>
+        <p:nvPr/>
+      </p:nvGrpSpPr>
+      <p:grpSpPr>
+        <a:xfrm>
+          <a:off x="0" y="0"/>
+          <a:ext cx="0" cy="0"/>
+          <a:chOff x="0" y="0"/>
+          <a:chExt cx="0" cy="0"/>
+        </a:xfrm>
+      </p:grpSpPr>
+      <p:sp useBgFill="1">
+        <p:nvSpPr>
+          <p:cNvPr id="75" name="Rectangle 74">
+            <a:extLst>
+              <a:ext uri="{FF2B5EF4-FFF2-40B4-BE49-F238E27FC236}">
+                <a16:creationId xmlns:a16="http://schemas.microsoft.com/office/drawing/2014/main" id="{9AA72BD9-2C5A-4EDC-931F-5AA08EACA0F3}"/>
+              </a:ext>
+              <a:ext uri="{C183D7F6-B498-43B3-948B-1728B52AA6E4}">
+                <adec:decorative xmlns:adec="http://schemas.microsoft.com/office/drawing/2017/decorative" val="1"/>
+              </a:ext>
+            </a:extLst>
+          </p:cNvPr>
+          <p:cNvSpPr>
+            <a:spLocks noGrp="1" noRot="1" noChangeAspect="1" noMove="1" noResize="1" noEditPoints="1" noAdjustHandles="1" noChangeArrowheads="1" noChangeShapeType="1" noTextEdit="1"/>
+          </p:cNvSpPr>
+          <p:nvPr>
+            <p:extLst>
+              <p:ext uri="{386F3935-93C4-4BCD-93E2-E3B085C9AB24}">
+                <p16:designElem xmlns:p16="http://schemas.microsoft.com/office/powerpoint/2015/main" val="1"/>
+              </p:ext>
+            </p:extLst>
+          </p:nvPr>
+        </p:nvSpPr>
+        <p:spPr>
+          <a:xfrm>
+            <a:off x="0" y="0"/>
+            <a:ext cx="12192000" cy="6858000"/>
+          </a:xfrm>
+          <a:prstGeom prst="rect">
+            <a:avLst/>
+          </a:prstGeom>
+          <a:ln>
+            <a:noFill/>
+          </a:ln>
+        </p:spPr>
+        <p:style>
+          <a:lnRef idx="2">
+            <a:schemeClr val="accent1">
+              <a:shade val="50000"/>
+            </a:schemeClr>
+          </a:lnRef>
+          <a:fillRef idx="1">
+            <a:schemeClr val="accent1"/>
+          </a:fillRef>
+          <a:effectRef idx="0">
+            <a:schemeClr val="accent1"/>
+          </a:effectRef>
+          <a:fontRef idx="minor">
+            <a:schemeClr val="lt1"/>
+          </a:fontRef>
+        </p:style>
+        <p:txBody>
+          <a:bodyPr rtlCol="0" anchor="ctr"/>
+          <a:lstStyle/>
+          <a:p>
+            <a:pPr algn="ctr"/>
+            <a:endParaRPr lang="en-US"/>
+          </a:p>
+        </p:txBody>
+      </p:sp>
+      <p:pic>
+        <p:nvPicPr>
+          <p:cNvPr id="9" name="Picture 2" descr="Structure and Function of the Heart">
+            <a:extLst>
+              <a:ext uri="{FF2B5EF4-FFF2-40B4-BE49-F238E27FC236}">
+                <a16:creationId xmlns:a16="http://schemas.microsoft.com/office/drawing/2014/main" id="{1792461E-E2A0-44AC-8D1D-D00CA59978A2}"/>
+              </a:ext>
+            </a:extLst>
+          </p:cNvPr>
+          <p:cNvPicPr>
+            <a:picLocks noChangeAspect="1" noChangeArrowheads="1"/>
+          </p:cNvPicPr>
+          <p:nvPr/>
+        </p:nvPicPr>
+        <p:blipFill rotWithShape="1">
+          <a:blip r:embed="rId2">
+            <a:extLst>
+              <a:ext uri="{28A0092B-C50C-407E-A947-70E740481C1C}">
+                <a14:useLocalDpi xmlns:a14="http://schemas.microsoft.com/office/drawing/2010/main" val="0"/>
+              </a:ext>
+            </a:extLst>
+          </a:blip>
+          <a:srcRect l="2824" t="9091" r="17880" b="2"/>
+          <a:stretch/>
+        </p:blipFill>
+        <p:spPr bwMode="auto">
+          <a:xfrm>
+            <a:off x="3522468" y="10"/>
+            <a:ext cx="8669532" cy="6857990"/>
+          </a:xfrm>
+          <a:prstGeom prst="rect">
+            <a:avLst/>
+          </a:prstGeom>
+          <a:noFill/>
+          <a:extLst>
+            <a:ext uri="{909E8E84-426E-40DD-AFC4-6F175D3DCCD1}">
+              <a14:hiddenFill xmlns:a14="http://schemas.microsoft.com/office/drawing/2010/main">
+                <a:solidFill>
+                  <a:srgbClr val="FFFFFF"/>
+                </a:solidFill>
+              </a14:hiddenFill>
+            </a:ext>
+          </a:extLst>
+        </p:spPr>
+      </p:pic>
+      <p:sp>
+        <p:nvSpPr>
+          <p:cNvPr id="77" name="Rectangle 76">
+            <a:extLst>
+              <a:ext uri="{FF2B5EF4-FFF2-40B4-BE49-F238E27FC236}">
+                <a16:creationId xmlns:a16="http://schemas.microsoft.com/office/drawing/2014/main" id="{DD3981AC-7B61-4947-BCF3-F7AA7FA385B9}"/>
+              </a:ext>
+              <a:ext uri="{C183D7F6-B498-43B3-948B-1728B52AA6E4}">
+                <adec:decorative xmlns:adec="http://schemas.microsoft.com/office/drawing/2017/decorative" val="1"/>
+              </a:ext>
+            </a:extLst>
+          </p:cNvPr>
+          <p:cNvSpPr>
+            <a:spLocks noGrp="1" noRot="1" noChangeAspect="1" noMove="1" noResize="1" noEditPoints="1" noAdjustHandles="1" noChangeArrowheads="1" noChangeShapeType="1" noTextEdit="1"/>
+          </p:cNvSpPr>
+          <p:nvPr>
+            <p:extLst>
+              <p:ext uri="{386F3935-93C4-4BCD-93E2-E3B085C9AB24}">
+                <p16:designElem xmlns:p16="http://schemas.microsoft.com/office/powerpoint/2015/main" val="1"/>
+              </p:ext>
+            </p:extLst>
+          </p:nvPr>
+        </p:nvSpPr>
+        <p:spPr>
+          <a:xfrm>
+            <a:off x="2" y="0"/>
+            <a:ext cx="9756601" cy="6858000"/>
+          </a:xfrm>
+          <a:prstGeom prst="rect">
+            <a:avLst/>
+          </a:prstGeom>
+          <a:gradFill>
+            <a:gsLst>
+              <a:gs pos="58000">
+                <a:schemeClr val="bg1"/>
+              </a:gs>
+              <a:gs pos="35000">
+                <a:schemeClr val="bg1">
+                  <a:alpha val="78000"/>
+                </a:schemeClr>
+              </a:gs>
+              <a:gs pos="19000">
+                <a:schemeClr val="bg1">
+                  <a:alpha val="38000"/>
+                </a:schemeClr>
+              </a:gs>
+              <a:gs pos="0">
+                <a:schemeClr val="bg1">
+                  <a:alpha val="0"/>
+                </a:schemeClr>
+              </a:gs>
+              <a:gs pos="100000">
+                <a:schemeClr val="bg1"/>
+              </a:gs>
+            </a:gsLst>
+            <a:lin ang="10800000" scaled="0"/>
+          </a:gradFill>
+          <a:ln>
+            <a:noFill/>
+          </a:ln>
+        </p:spPr>
+        <p:style>
+          <a:lnRef idx="2">
+            <a:schemeClr val="accent1">
+              <a:shade val="50000"/>
+            </a:schemeClr>
+          </a:lnRef>
+          <a:fillRef idx="1">
+            <a:schemeClr val="accent1"/>
+          </a:fillRef>
+          <a:effectRef idx="0">
+            <a:schemeClr val="accent1"/>
+          </a:effectRef>
+          <a:fontRef idx="minor">
+            <a:schemeClr val="lt1"/>
+          </a:fontRef>
+        </p:style>
+        <p:txBody>
+          <a:bodyPr rtlCol="0" anchor="ctr"/>
+          <a:lstStyle/>
+          <a:p>
+            <a:pPr algn="ctr"/>
+            <a:endParaRPr lang="en-US" dirty="0"/>
+          </a:p>
+        </p:txBody>
+      </p:sp>
+      <p:sp>
+        <p:nvSpPr>
+          <p:cNvPr id="4" name="Title 3">
+            <a:extLst>
+              <a:ext uri="{FF2B5EF4-FFF2-40B4-BE49-F238E27FC236}">
+                <a16:creationId xmlns:a16="http://schemas.microsoft.com/office/drawing/2014/main" id="{B10698EF-6849-4919-ABCB-2C8441208E9F}"/>
+              </a:ext>
+            </a:extLst>
+          </p:cNvPr>
+          <p:cNvSpPr>
+            <a:spLocks noGrp="1"/>
+          </p:cNvSpPr>
+          <p:nvPr>
+            <p:ph type="title"/>
+          </p:nvPr>
+        </p:nvSpPr>
+        <p:spPr>
+          <a:xfrm>
+            <a:off x="371094" y="1161288"/>
+            <a:ext cx="3438144" cy="1124712"/>
+          </a:xfrm>
+        </p:spPr>
+        <p:txBody>
+          <a:bodyPr anchor="b">
+            <a:normAutofit/>
+          </a:bodyPr>
+          <a:lstStyle/>
+          <a:p>
+            <a:r>
+              <a:rPr lang="en-US" sz="2800" dirty="0"/>
+              <a:t>Findings</a:t>
+            </a:r>
+          </a:p>
+        </p:txBody>
+      </p:sp>
+      <p:sp>
+        <p:nvSpPr>
+          <p:cNvPr id="79" name="Rectangle 78">
+            <a:extLst>
+              <a:ext uri="{FF2B5EF4-FFF2-40B4-BE49-F238E27FC236}">
+                <a16:creationId xmlns:a16="http://schemas.microsoft.com/office/drawing/2014/main" id="{55D4142C-5077-457F-A6AD-3FECFDB39685}"/>
+              </a:ext>
+              <a:ext uri="{C183D7F6-B498-43B3-948B-1728B52AA6E4}">
+                <adec:decorative xmlns:adec="http://schemas.microsoft.com/office/drawing/2017/decorative" val="1"/>
+              </a:ext>
+            </a:extLst>
+          </p:cNvPr>
+          <p:cNvSpPr>
+            <a:spLocks noGrp="1" noRot="1" noChangeAspect="1" noMove="1" noResize="1" noEditPoints="1" noAdjustHandles="1" noChangeArrowheads="1" noChangeShapeType="1" noTextEdit="1"/>
+          </p:cNvSpPr>
+          <p:nvPr>
+            <p:extLst>
+              <p:ext uri="{386F3935-93C4-4BCD-93E2-E3B085C9AB24}">
+                <p16:designElem xmlns:p16="http://schemas.microsoft.com/office/powerpoint/2015/main" val="1"/>
+              </p:ext>
+            </p:extLst>
+          </p:nvPr>
+        </p:nvSpPr>
+        <p:spPr>
+          <a:xfrm rot="5400000">
+            <a:off x="662559" y="605790"/>
+            <a:ext cx="73152" cy="548640"/>
+          </a:xfrm>
+          <a:prstGeom prst="rect">
+            <a:avLst/>
+          </a:prstGeom>
+          <a:solidFill>
+            <a:schemeClr val="accent2"/>
+          </a:solidFill>
+          <a:ln>
+            <a:noFill/>
+          </a:ln>
+        </p:spPr>
+        <p:style>
+          <a:lnRef idx="2">
+            <a:schemeClr val="accent1">
+              <a:shade val="50000"/>
+            </a:schemeClr>
+          </a:lnRef>
+          <a:fillRef idx="1">
+            <a:schemeClr val="accent1"/>
+          </a:fillRef>
+          <a:effectRef idx="0">
+            <a:schemeClr val="accent1"/>
+          </a:effectRef>
+          <a:fontRef idx="minor">
+            <a:schemeClr val="lt1"/>
+          </a:fontRef>
+        </p:style>
+        <p:txBody>
+          <a:bodyPr rtlCol="0" anchor="ctr"/>
+          <a:lstStyle/>
+          <a:p>
+            <a:pPr algn="ctr"/>
+            <a:endParaRPr lang="en-US">
+              <a:solidFill>
+                <a:prstClr val="white"/>
+              </a:solidFill>
+              <a:latin typeface="Calibri" panose="020F0502020204030204"/>
+            </a:endParaRPr>
+          </a:p>
+        </p:txBody>
+      </p:sp>
+      <p:sp>
+        <p:nvSpPr>
+          <p:cNvPr id="81" name="Rectangle 80">
+            <a:extLst>
+              <a:ext uri="{FF2B5EF4-FFF2-40B4-BE49-F238E27FC236}">
+                <a16:creationId xmlns:a16="http://schemas.microsoft.com/office/drawing/2014/main" id="{7A5F0580-5EE9-419F-96EE-B6529EF6E7D0}"/>
+              </a:ext>
+              <a:ext uri="{C183D7F6-B498-43B3-948B-1728B52AA6E4}">
+                <adec:decorative xmlns:adec="http://schemas.microsoft.com/office/drawing/2017/decorative" val="1"/>
+              </a:ext>
+            </a:extLst>
+          </p:cNvPr>
+          <p:cNvSpPr>
+            <a:spLocks noGrp="1" noRot="1" noChangeAspect="1" noMove="1" noResize="1" noEditPoints="1" noAdjustHandles="1" noChangeArrowheads="1" noChangeShapeType="1" noTextEdit="1"/>
+          </p:cNvSpPr>
+          <p:nvPr>
+            <p:extLst>
+              <p:ext uri="{386F3935-93C4-4BCD-93E2-E3B085C9AB24}">
+                <p16:designElem xmlns:p16="http://schemas.microsoft.com/office/powerpoint/2015/main" val="1"/>
+              </p:ext>
+            </p:extLst>
+          </p:nvPr>
+        </p:nvSpPr>
+        <p:spPr>
+          <a:xfrm>
+            <a:off x="428244" y="2443480"/>
+            <a:ext cx="3300984" cy="18288"/>
+          </a:xfrm>
+          <a:prstGeom prst="rect">
+            <a:avLst/>
+          </a:prstGeom>
+          <a:solidFill>
+            <a:schemeClr val="tx1"/>
+          </a:solidFill>
+          <a:ln w="3175">
+            <a:noFill/>
+          </a:ln>
+          <a:effectLst/>
+        </p:spPr>
+        <p:style>
+          <a:lnRef idx="2">
+            <a:schemeClr val="accent1">
+              <a:shade val="50000"/>
+            </a:schemeClr>
+          </a:lnRef>
+          <a:fillRef idx="1">
+            <a:schemeClr val="accent1"/>
+          </a:fillRef>
+          <a:effectRef idx="0">
+            <a:schemeClr val="accent1"/>
+          </a:effectRef>
+          <a:fontRef idx="minor">
+            <a:schemeClr val="lt1"/>
+          </a:fontRef>
+        </p:style>
+        <p:txBody>
+          <a:bodyPr rtlCol="0" anchor="ctr"/>
+          <a:lstStyle/>
+          <a:p>
+            <a:pPr marL="0" marR="0" lvl="0" indent="0" algn="ctr" defTabSz="914400" rtl="0" eaLnBrk="1" fontAlgn="auto" latinLnBrk="0" hangingPunct="1">
+              <a:lnSpc>
+                <a:spcPct val="100000"/>
+              </a:lnSpc>
+              <a:spcBef>
+                <a:spcPts val="0"/>
+              </a:spcBef>
+              <a:spcAft>
+                <a:spcPts val="0"/>
+              </a:spcAft>
+              <a:buClrTx/>
+              <a:buSzTx/>
+              <a:buFontTx/>
+              <a:buNone/>
+              <a:tabLst/>
+              <a:defRPr/>
+            </a:pPr>
+            <a:endParaRPr kumimoji="0" lang="en-US" sz="1800" b="0" i="0" u="none" strike="noStrike" kern="1200" cap="none" spc="0" normalizeH="0" baseline="0" noProof="0">
+              <a:ln>
+                <a:noFill/>
+              </a:ln>
+              <a:solidFill>
+                <a:prstClr val="white"/>
+              </a:solidFill>
+              <a:effectLst/>
+              <a:uLnTx/>
+              <a:uFillTx/>
+              <a:latin typeface="Calibri" panose="020F0502020204030204"/>
+              <a:ea typeface="+mn-ea"/>
+              <a:cs typeface="+mn-cs"/>
+            </a:endParaRPr>
+          </a:p>
+        </p:txBody>
+      </p:sp>
+      <p:sp>
+        <p:nvSpPr>
+          <p:cNvPr id="3078" name="Content Placeholder 3077">
+            <a:extLst>
+              <a:ext uri="{FF2B5EF4-FFF2-40B4-BE49-F238E27FC236}">
+                <a16:creationId xmlns:a16="http://schemas.microsoft.com/office/drawing/2014/main" id="{AD29817E-5388-45CB-8BBB-A3265035D8AE}"/>
+              </a:ext>
+            </a:extLst>
+          </p:cNvPr>
+          <p:cNvSpPr>
+            <a:spLocks noGrp="1"/>
+          </p:cNvSpPr>
+          <p:nvPr>
+            <p:ph idx="1"/>
+          </p:nvPr>
+        </p:nvSpPr>
+        <p:spPr>
+          <a:xfrm>
+            <a:off x="371094" y="2718054"/>
+            <a:ext cx="3438906" cy="3207258"/>
+          </a:xfrm>
+        </p:spPr>
+        <p:txBody>
+          <a:bodyPr anchor="t">
+            <a:normAutofit/>
+          </a:bodyPr>
+          <a:lstStyle/>
+          <a:p>
+            <a:endParaRPr lang="en-US" sz="1700" dirty="0"/>
+          </a:p>
+        </p:txBody>
+      </p:sp>
+    </p:spTree>
+    <p:extLst>
+      <p:ext uri="{BB962C8B-B14F-4D97-AF65-F5344CB8AC3E}">
+        <p14:creationId xmlns:p14="http://schemas.microsoft.com/office/powerpoint/2010/main" val="1990266411"/>
+      </p:ext>
+    </p:extLst>
+  </p:cSld>
+  <p:clrMapOvr>
+    <a:overrideClrMapping bg1="dk1" tx1="lt1" bg2="dk2" tx2="lt2" accent1="accent1" accent2="accent2" accent3="accent3" accent4="accent4" accent5="accent5" accent6="accent6" hlink="hlink" folHlink="folHlink"/>
+  </p:clrMapOvr>
+</p:sld>
+</file>
+
+<file path=ppt/slides/slide7.xml><?xml version="1.0" encoding="utf-8"?>
+<p:sld xmlns:a="http://schemas.openxmlformats.org/drawingml/2006/main" xmlns:r="http://schemas.openxmlformats.org/officeDocument/2006/relationships" xmlns:p="http://schemas.openxmlformats.org/presentationml/2006/main">
+  <p:cSld>
+    <p:bg>
+      <p:bgPr>
+        <a:solidFill>
+          <a:schemeClr val="bg1"/>
+        </a:solidFill>
+        <a:effectLst/>
+      </p:bgPr>
+    </p:bg>
+    <p:spTree>
+      <p:nvGrpSpPr>
+        <p:cNvPr id="1" name=""/>
+        <p:cNvGrpSpPr/>
+        <p:nvPr/>
+      </p:nvGrpSpPr>
+      <p:grpSpPr>
+        <a:xfrm>
+          <a:off x="0" y="0"/>
+          <a:ext cx="0" cy="0"/>
+          <a:chOff x="0" y="0"/>
+          <a:chExt cx="0" cy="0"/>
+        </a:xfrm>
+      </p:grpSpPr>
+      <p:sp useBgFill="1">
+        <p:nvSpPr>
+          <p:cNvPr id="18" name="Rectangle 9">
+            <a:extLst>
+              <a:ext uri="{FF2B5EF4-FFF2-40B4-BE49-F238E27FC236}">
+                <a16:creationId xmlns:a16="http://schemas.microsoft.com/office/drawing/2014/main" id="{9AA72BD9-2C5A-4EDC-931F-5AA08EACA0F3}"/>
+              </a:ext>
+              <a:ext uri="{C183D7F6-B498-43B3-948B-1728B52AA6E4}">
+                <adec:decorative xmlns:adec="http://schemas.microsoft.com/office/drawing/2017/decorative" val="1"/>
+              </a:ext>
+            </a:extLst>
+          </p:cNvPr>
+          <p:cNvSpPr>
+            <a:spLocks noGrp="1" noRot="1" noChangeAspect="1" noMove="1" noResize="1" noEditPoints="1" noAdjustHandles="1" noChangeArrowheads="1" noChangeShapeType="1" noTextEdit="1"/>
+          </p:cNvSpPr>
+          <p:nvPr>
+            <p:extLst>
+              <p:ext uri="{386F3935-93C4-4BCD-93E2-E3B085C9AB24}">
+                <p16:designElem xmlns:p16="http://schemas.microsoft.com/office/powerpoint/2015/main" val="1"/>
+              </p:ext>
+            </p:extLst>
+          </p:nvPr>
+        </p:nvSpPr>
+        <p:spPr>
+          <a:xfrm>
+            <a:off x="0" y="0"/>
+            <a:ext cx="12192000" cy="6858000"/>
+          </a:xfrm>
+          <a:prstGeom prst="rect">
+            <a:avLst/>
+          </a:prstGeom>
+          <a:ln>
+            <a:noFill/>
+          </a:ln>
+        </p:spPr>
+        <p:style>
+          <a:lnRef idx="2">
+            <a:schemeClr val="accent1">
+              <a:shade val="50000"/>
+            </a:schemeClr>
+          </a:lnRef>
+          <a:fillRef idx="1">
+            <a:schemeClr val="accent1"/>
+          </a:fillRef>
+          <a:effectRef idx="0">
+            <a:schemeClr val="accent1"/>
+          </a:effectRef>
+          <a:fontRef idx="minor">
+            <a:schemeClr val="lt1"/>
+          </a:fontRef>
+        </p:style>
+        <p:txBody>
+          <a:bodyPr rtlCol="0" anchor="ctr"/>
+          <a:lstStyle/>
+          <a:p>
+            <a:pPr algn="ctr"/>
+            <a:endParaRPr lang="en-US"/>
+          </a:p>
+        </p:txBody>
+      </p:sp>
+      <p:pic>
+        <p:nvPicPr>
+          <p:cNvPr id="19" name="Picture 5" descr="Path winding through a grassy field">
+            <a:extLst>
+              <a:ext uri="{FF2B5EF4-FFF2-40B4-BE49-F238E27FC236}">
+                <a16:creationId xmlns:a16="http://schemas.microsoft.com/office/drawing/2014/main" id="{BFA2E078-E095-4510-B9E5-A5EAE6602327}"/>
+              </a:ext>
+            </a:extLst>
+          </p:cNvPr>
+          <p:cNvPicPr>
+            <a:picLocks noChangeAspect="1"/>
+          </p:cNvPicPr>
+          <p:nvPr/>
+        </p:nvPicPr>
+        <p:blipFill rotWithShape="1">
+          <a:blip r:embed="rId2"/>
+          <a:srcRect l="1740" r="13877" b="-1"/>
+          <a:stretch/>
+        </p:blipFill>
+        <p:spPr>
+          <a:xfrm>
+            <a:off x="3522468" y="10"/>
+            <a:ext cx="8669532" cy="6857990"/>
+          </a:xfrm>
+          <a:prstGeom prst="rect">
+            <a:avLst/>
+          </a:prstGeom>
+        </p:spPr>
+      </p:pic>
+      <p:sp>
+        <p:nvSpPr>
+          <p:cNvPr id="20" name="Rectangle 11">
+            <a:extLst>
+              <a:ext uri="{FF2B5EF4-FFF2-40B4-BE49-F238E27FC236}">
+                <a16:creationId xmlns:a16="http://schemas.microsoft.com/office/drawing/2014/main" id="{DD3981AC-7B61-4947-BCF3-F7AA7FA385B9}"/>
+              </a:ext>
+              <a:ext uri="{C183D7F6-B498-43B3-948B-1728B52AA6E4}">
+                <adec:decorative xmlns:adec="http://schemas.microsoft.com/office/drawing/2017/decorative" val="1"/>
+              </a:ext>
+            </a:extLst>
+          </p:cNvPr>
+          <p:cNvSpPr>
+            <a:spLocks noGrp="1" noRot="1" noChangeAspect="1" noMove="1" noResize="1" noEditPoints="1" noAdjustHandles="1" noChangeArrowheads="1" noChangeShapeType="1" noTextEdit="1"/>
+          </p:cNvSpPr>
+          <p:nvPr>
+            <p:extLst>
+              <p:ext uri="{386F3935-93C4-4BCD-93E2-E3B085C9AB24}">
+                <p16:designElem xmlns:p16="http://schemas.microsoft.com/office/powerpoint/2015/main" val="1"/>
+              </p:ext>
+            </p:extLst>
+          </p:nvPr>
+        </p:nvSpPr>
+        <p:spPr>
+          <a:xfrm>
+            <a:off x="2" y="0"/>
+            <a:ext cx="9756601" cy="6858000"/>
+          </a:xfrm>
+          <a:prstGeom prst="rect">
+            <a:avLst/>
+          </a:prstGeom>
+          <a:gradFill>
+            <a:gsLst>
+              <a:gs pos="58000">
+                <a:schemeClr val="bg1"/>
+              </a:gs>
+              <a:gs pos="35000">
+                <a:schemeClr val="bg1">
+                  <a:alpha val="78000"/>
+                </a:schemeClr>
+              </a:gs>
+              <a:gs pos="19000">
+                <a:schemeClr val="bg1">
+                  <a:alpha val="38000"/>
+                </a:schemeClr>
+              </a:gs>
+              <a:gs pos="0">
+                <a:schemeClr val="bg1">
+                  <a:alpha val="0"/>
+                </a:schemeClr>
+              </a:gs>
+              <a:gs pos="100000">
+                <a:schemeClr val="bg1"/>
+              </a:gs>
+            </a:gsLst>
+            <a:lin ang="10800000" scaled="0"/>
+          </a:gradFill>
+          <a:ln>
+            <a:noFill/>
+          </a:ln>
+        </p:spPr>
+        <p:style>
+          <a:lnRef idx="2">
+            <a:schemeClr val="accent1">
+              <a:shade val="50000"/>
+            </a:schemeClr>
+          </a:lnRef>
+          <a:fillRef idx="1">
+            <a:schemeClr val="accent1"/>
+          </a:fillRef>
+          <a:effectRef idx="0">
+            <a:schemeClr val="accent1"/>
+          </a:effectRef>
+          <a:fontRef idx="minor">
+            <a:schemeClr val="lt1"/>
+          </a:fontRef>
+        </p:style>
+        <p:txBody>
+          <a:bodyPr rtlCol="0" anchor="ctr"/>
+          <a:lstStyle/>
+          <a:p>
+            <a:pPr algn="ctr"/>
+            <a:endParaRPr lang="en-US" dirty="0"/>
+          </a:p>
+        </p:txBody>
+      </p:sp>
+      <p:sp>
+        <p:nvSpPr>
+          <p:cNvPr id="4" name="Title 3">
+            <a:extLst>
+              <a:ext uri="{FF2B5EF4-FFF2-40B4-BE49-F238E27FC236}">
+                <a16:creationId xmlns:a16="http://schemas.microsoft.com/office/drawing/2014/main" id="{B10698EF-6849-4919-ABCB-2C8441208E9F}"/>
+              </a:ext>
+            </a:extLst>
+          </p:cNvPr>
+          <p:cNvSpPr>
+            <a:spLocks noGrp="1"/>
+          </p:cNvSpPr>
+          <p:nvPr>
+            <p:ph type="title"/>
+          </p:nvPr>
+        </p:nvSpPr>
+        <p:spPr>
+          <a:xfrm>
+            <a:off x="371094" y="1161288"/>
+            <a:ext cx="3438144" cy="1124712"/>
+          </a:xfrm>
+        </p:spPr>
+        <p:txBody>
+          <a:bodyPr anchor="b">
+            <a:normAutofit/>
+          </a:bodyPr>
+          <a:lstStyle/>
+          <a:p>
+            <a:r>
+              <a:rPr lang="en-US" sz="2800"/>
               <a:t>Next Steps</a:t>
             </a:r>
           </a:p>
@@ -4716,10 +6397,171 @@
       </p:sp>
       <p:sp>
         <p:nvSpPr>
-          <p:cNvPr id="5" name="Content Placeholder 4">
-            <a:extLst>
-              <a:ext uri="{FF2B5EF4-FFF2-40B4-BE49-F238E27FC236}">
-                <a16:creationId xmlns:a16="http://schemas.microsoft.com/office/drawing/2014/main" id="{377130E7-C32B-4455-887B-FE07045D583F}"/>
+          <p:cNvPr id="21" name="Rectangle 13">
+            <a:extLst>
+              <a:ext uri="{FF2B5EF4-FFF2-40B4-BE49-F238E27FC236}">
+                <a16:creationId xmlns:a16="http://schemas.microsoft.com/office/drawing/2014/main" id="{55D4142C-5077-457F-A6AD-3FECFDB39685}"/>
+              </a:ext>
+              <a:ext uri="{C183D7F6-B498-43B3-948B-1728B52AA6E4}">
+                <adec:decorative xmlns:adec="http://schemas.microsoft.com/office/drawing/2017/decorative" val="1"/>
+              </a:ext>
+            </a:extLst>
+          </p:cNvPr>
+          <p:cNvSpPr>
+            <a:spLocks noGrp="1" noRot="1" noChangeAspect="1" noMove="1" noResize="1" noEditPoints="1" noAdjustHandles="1" noChangeArrowheads="1" noChangeShapeType="1" noTextEdit="1"/>
+          </p:cNvSpPr>
+          <p:nvPr>
+            <p:extLst>
+              <p:ext uri="{386F3935-93C4-4BCD-93E2-E3B085C9AB24}">
+                <p16:designElem xmlns:p16="http://schemas.microsoft.com/office/powerpoint/2015/main" val="1"/>
+              </p:ext>
+            </p:extLst>
+          </p:nvPr>
+        </p:nvSpPr>
+        <p:spPr>
+          <a:xfrm rot="5400000">
+            <a:off x="662559" y="605790"/>
+            <a:ext cx="73152" cy="548640"/>
+          </a:xfrm>
+          <a:prstGeom prst="rect">
+            <a:avLst/>
+          </a:prstGeom>
+          <a:solidFill>
+            <a:schemeClr val="accent2"/>
+          </a:solidFill>
+          <a:ln>
+            <a:noFill/>
+          </a:ln>
+        </p:spPr>
+        <p:style>
+          <a:lnRef idx="2">
+            <a:schemeClr val="accent1">
+              <a:shade val="50000"/>
+            </a:schemeClr>
+          </a:lnRef>
+          <a:fillRef idx="1">
+            <a:schemeClr val="accent1"/>
+          </a:fillRef>
+          <a:effectRef idx="0">
+            <a:schemeClr val="accent1"/>
+          </a:effectRef>
+          <a:fontRef idx="minor">
+            <a:schemeClr val="lt1"/>
+          </a:fontRef>
+        </p:style>
+        <p:txBody>
+          <a:bodyPr rtlCol="0" anchor="ctr"/>
+          <a:lstStyle/>
+          <a:p>
+            <a:pPr algn="ctr"/>
+            <a:endParaRPr lang="en-US">
+              <a:solidFill>
+                <a:prstClr val="white"/>
+              </a:solidFill>
+              <a:latin typeface="Calibri" panose="020F0502020204030204"/>
+            </a:endParaRPr>
+          </a:p>
+        </p:txBody>
+      </p:sp>
+      <p:sp>
+        <p:nvSpPr>
+          <p:cNvPr id="22" name="Rectangle 15">
+            <a:extLst>
+              <a:ext uri="{FF2B5EF4-FFF2-40B4-BE49-F238E27FC236}">
+                <a16:creationId xmlns:a16="http://schemas.microsoft.com/office/drawing/2014/main" id="{7A5F0580-5EE9-419F-96EE-B6529EF6E7D0}"/>
+              </a:ext>
+              <a:ext uri="{C183D7F6-B498-43B3-948B-1728B52AA6E4}">
+                <adec:decorative xmlns:adec="http://schemas.microsoft.com/office/drawing/2017/decorative" val="1"/>
+              </a:ext>
+            </a:extLst>
+          </p:cNvPr>
+          <p:cNvSpPr>
+            <a:spLocks noGrp="1" noRot="1" noChangeAspect="1" noMove="1" noResize="1" noEditPoints="1" noAdjustHandles="1" noChangeArrowheads="1" noChangeShapeType="1" noTextEdit="1"/>
+          </p:cNvSpPr>
+          <p:nvPr>
+            <p:extLst>
+              <p:ext uri="{386F3935-93C4-4BCD-93E2-E3B085C9AB24}">
+                <p16:designElem xmlns:p16="http://schemas.microsoft.com/office/powerpoint/2015/main" val="1"/>
+              </p:ext>
+            </p:extLst>
+          </p:nvPr>
+        </p:nvSpPr>
+        <p:spPr>
+          <a:xfrm>
+            <a:off x="428244" y="2443480"/>
+            <a:ext cx="3300984" cy="18288"/>
+          </a:xfrm>
+          <a:prstGeom prst="rect">
+            <a:avLst/>
+          </a:prstGeom>
+          <a:solidFill>
+            <a:schemeClr val="tx1"/>
+          </a:solidFill>
+          <a:ln w="3175">
+            <a:noFill/>
+          </a:ln>
+          <a:effectLst/>
+        </p:spPr>
+        <p:style>
+          <a:lnRef idx="2">
+            <a:schemeClr val="accent1">
+              <a:shade val="50000"/>
+            </a:schemeClr>
+          </a:lnRef>
+          <a:fillRef idx="1">
+            <a:schemeClr val="accent1"/>
+          </a:fillRef>
+          <a:effectRef idx="0">
+            <a:schemeClr val="accent1"/>
+          </a:effectRef>
+          <a:fontRef idx="minor">
+            <a:schemeClr val="lt1"/>
+          </a:fontRef>
+        </p:style>
+        <p:txBody>
+          <a:bodyPr rtlCol="0" anchor="ctr"/>
+          <a:lstStyle/>
+          <a:p>
+            <a:pPr marL="0" marR="0" lvl="0" indent="0" algn="ctr" defTabSz="914400" rtl="0" eaLnBrk="1" fontAlgn="auto" latinLnBrk="0" hangingPunct="1">
+              <a:lnSpc>
+                <a:spcPct val="100000"/>
+              </a:lnSpc>
+              <a:spcBef>
+                <a:spcPts val="0"/>
+              </a:spcBef>
+              <a:spcAft>
+                <a:spcPts val="0"/>
+              </a:spcAft>
+              <a:buClrTx/>
+              <a:buSzTx/>
+              <a:buFontTx/>
+              <a:buNone/>
+              <a:tabLst/>
+              <a:defRPr/>
+            </a:pPr>
+            <a:endParaRPr kumimoji="0" lang="en-US" sz="1800" b="0" i="0" u="none" strike="noStrike" kern="1200" cap="none" spc="0" normalizeH="0" baseline="0" noProof="0">
+              <a:ln>
+                <a:noFill/>
+              </a:ln>
+              <a:solidFill>
+                <a:prstClr val="white"/>
+              </a:solidFill>
+              <a:effectLst/>
+              <a:uLnTx/>
+              <a:uFillTx/>
+              <a:latin typeface="Calibri" panose="020F0502020204030204"/>
+              <a:ea typeface="+mn-ea"/>
+              <a:cs typeface="+mn-cs"/>
+            </a:endParaRPr>
+          </a:p>
+        </p:txBody>
+      </p:sp>
+      <p:sp>
+        <p:nvSpPr>
+          <p:cNvPr id="2" name="Content Placeholder 1">
+            <a:extLst>
+              <a:ext uri="{FF2B5EF4-FFF2-40B4-BE49-F238E27FC236}">
+                <a16:creationId xmlns:a16="http://schemas.microsoft.com/office/drawing/2014/main" id="{7E31912F-2775-4C54-B694-0B8CC6048388}"/>
               </a:ext>
             </a:extLst>
           </p:cNvPr>
@@ -4730,12 +6572,34 @@
             <p:ph idx="1"/>
           </p:nvPr>
         </p:nvSpPr>
-        <p:spPr/>
-        <p:txBody>
-          <a:bodyPr/>
-          <a:lstStyle/>
-          <a:p>
-            <a:endParaRPr lang="en-US"/>
+        <p:spPr>
+          <a:xfrm>
+            <a:off x="371094" y="2718054"/>
+            <a:ext cx="3438906" cy="3207258"/>
+          </a:xfrm>
+        </p:spPr>
+        <p:txBody>
+          <a:bodyPr anchor="t">
+            <a:normAutofit/>
+          </a:bodyPr>
+          <a:lstStyle/>
+          <a:p>
+            <a:r>
+              <a:rPr lang="en-US" sz="1700" dirty="0"/>
+              <a:t>Look into separating into different dataset based on gender to possibly remove bias.</a:t>
+            </a:r>
+          </a:p>
+          <a:p>
+            <a:r>
+              <a:rPr lang="en-US" sz="1700" dirty="0"/>
+              <a:t>Explore other ML models. </a:t>
+            </a:r>
+          </a:p>
+          <a:p>
+            <a:r>
+              <a:rPr lang="en-US" sz="1700" dirty="0"/>
+              <a:t>Re-do the clustering by removing the outliers.</a:t>
+            </a:r>
           </a:p>
         </p:txBody>
       </p:sp>
@@ -4747,7 +6611,7 @@
     </p:extLst>
   </p:cSld>
   <p:clrMapOvr>
-    <a:masterClrMapping/>
+    <a:overrideClrMapping bg1="dk1" tx1="lt1" bg2="dk2" tx2="lt2" accent1="accent1" accent2="accent2" accent3="accent3" accent4="accent4" accent5="accent5" accent6="accent6" hlink="hlink" folHlink="folHlink"/>
   </p:clrMapOvr>
 </p:sld>
 </file>

</xml_diff>